<commit_message>
added Vorstellung, finnished antrag and machbarkeit
</commit_message>
<xml_diff>
--- a/DIG-HIT_Vortstellung.pptx
+++ b/DIG-HIT_Vortstellung.pptx
@@ -177,7 +177,7 @@
   <pc:docChgLst>
     <pc:chgData name="Wilhelm Moritz Gregor" userId="bce27b53-47f4-4b83-9a61-a63a109bd62d" providerId="ADAL" clId="{C1F21C7E-4621-4C94-B876-B4E6A5D7943F}"/>
     <pc:docChg chg="undo custSel modSld">
-      <pc:chgData name="Wilhelm Moritz Gregor" userId="bce27b53-47f4-4b83-9a61-a63a109bd62d" providerId="ADAL" clId="{C1F21C7E-4621-4C94-B876-B4E6A5D7943F}" dt="2025-03-04T07:06:14.876" v="84" actId="1076"/>
+      <pc:chgData name="Wilhelm Moritz Gregor" userId="bce27b53-47f4-4b83-9a61-a63a109bd62d" providerId="ADAL" clId="{C1F21C7E-4621-4C94-B876-B4E6A5D7943F}" dt="2025-03-04T07:27:04.287" v="85" actId="403"/>
       <pc:docMkLst>
         <pc:docMk/>
       </pc:docMkLst>
@@ -197,7 +197,7 @@
         </pc:spChg>
       </pc:sldChg>
       <pc:sldChg chg="addSp modSp mod">
-        <pc:chgData name="Wilhelm Moritz Gregor" userId="bce27b53-47f4-4b83-9a61-a63a109bd62d" providerId="ADAL" clId="{C1F21C7E-4621-4C94-B876-B4E6A5D7943F}" dt="2025-03-04T07:06:14.876" v="84" actId="1076"/>
+        <pc:chgData name="Wilhelm Moritz Gregor" userId="bce27b53-47f4-4b83-9a61-a63a109bd62d" providerId="ADAL" clId="{C1F21C7E-4621-4C94-B876-B4E6A5D7943F}" dt="2025-03-04T07:27:04.287" v="85" actId="403"/>
         <pc:sldMkLst>
           <pc:docMk/>
           <pc:sldMk cId="1338167130" sldId="317"/>
@@ -211,7 +211,7 @@
           </ac:spMkLst>
         </pc:spChg>
         <pc:spChg chg="mod">
-          <ac:chgData name="Wilhelm Moritz Gregor" userId="bce27b53-47f4-4b83-9a61-a63a109bd62d" providerId="ADAL" clId="{C1F21C7E-4621-4C94-B876-B4E6A5D7943F}" dt="2025-03-04T07:02:50.049" v="29" actId="403"/>
+          <ac:chgData name="Wilhelm Moritz Gregor" userId="bce27b53-47f4-4b83-9a61-a63a109bd62d" providerId="ADAL" clId="{C1F21C7E-4621-4C94-B876-B4E6A5D7943F}" dt="2025-03-04T07:27:04.287" v="85" actId="403"/>
           <ac:spMkLst>
             <pc:docMk/>
             <pc:sldMk cId="1338167130" sldId="317"/>
@@ -27653,7 +27653,7 @@
           <a:p>
             <a:pPr rtl="0"/>
             <a:r>
-              <a:rPr lang="de-DE" sz="6600" dirty="0"/>
+              <a:rPr lang="de-DE" sz="7200" dirty="0"/>
               <a:t>DIG HIT</a:t>
             </a:r>
           </a:p>
@@ -29556,6 +29556,26 @@
 </file>
 
 <file path=customXml/item1.xml><?xml version="1.0" encoding="utf-8"?>
+<p:properties xmlns:p="http://schemas.microsoft.com/office/2006/metadata/properties" xmlns:xsi="http://www.w3.org/2001/XMLSchema-instance" xmlns:pc="http://schemas.microsoft.com/office/infopath/2007/PartnerControls">
+  <documentManagement>
+    <_ip_UnifiedCompliancePolicyUIAction xmlns="http://schemas.microsoft.com/sharepoint/v3" xsi:nil="true"/>
+    <Image xmlns="71af3243-3dd4-4a8d-8c0d-dd76da1f02a5">
+      <Url xsi:nil="true"/>
+      <Description xsi:nil="true"/>
+    </Image>
+    <Status xmlns="71af3243-3dd4-4a8d-8c0d-dd76da1f02a5">Not started</Status>
+    <Background xmlns="71af3243-3dd4-4a8d-8c0d-dd76da1f02a5">false</Background>
+    <_ip_UnifiedCompliancePolicyProperties xmlns="http://schemas.microsoft.com/sharepoint/v3" xsi:nil="true"/>
+    <ImageTagsTaxHTField xmlns="71af3243-3dd4-4a8d-8c0d-dd76da1f02a5">
+      <Terms xmlns="http://schemas.microsoft.com/office/infopath/2007/PartnerControls"/>
+    </ImageTagsTaxHTField>
+    <TaxCatchAll xmlns="230e9df3-be65-4c73-a93b-d1236ebd677e" xsi:nil="true"/>
+    <MediaServiceKeyPoints xmlns="71af3243-3dd4-4a8d-8c0d-dd76da1f02a5" xsi:nil="true"/>
+  </documentManagement>
+</p:properties>
+</file>
+
+<file path=customXml/item2.xml><?xml version="1.0" encoding="utf-8"?>
 <ct:contentTypeSchema xmlns:ct="http://schemas.microsoft.com/office/2006/metadata/contentType" xmlns:ma="http://schemas.microsoft.com/office/2006/metadata/properties/metaAttributes" ct:_="" ma:_="" ma:contentTypeName="Document" ma:contentTypeID="0x01010079F111ED35F8CC479449609E8A0923A6" ma:contentTypeVersion="28" ma:contentTypeDescription="Create a new document." ma:contentTypeScope="" ma:versionID="60f5a4f2d2b0abadcf532d48ebf9cb71">
   <xsd:schema xmlns:xsd="http://www.w3.org/2001/XMLSchema" xmlns:xs="http://www.w3.org/2001/XMLSchema" xmlns:p="http://schemas.microsoft.com/office/2006/metadata/properties" xmlns:ns1="http://schemas.microsoft.com/sharepoint/v3" xmlns:ns2="71af3243-3dd4-4a8d-8c0d-dd76da1f02a5" xmlns:ns3="16c05727-aa75-4e4a-9b5f-8a80a1165891" xmlns:ns4="230e9df3-be65-4c73-a93b-d1236ebd677e" targetNamespace="http://schemas.microsoft.com/office/2006/metadata/properties" ma:root="true" ma:fieldsID="7dd78129e6a1811f84807ad11c651531" ns1:_="" ns2:_="" ns3:_="" ns4:_="">
     <xsd:import namespace="http://schemas.microsoft.com/sharepoint/v3"/>
@@ -29867,26 +29887,6 @@
 </ct:contentTypeSchema>
 </file>
 
-<file path=customXml/item2.xml><?xml version="1.0" encoding="utf-8"?>
-<p:properties xmlns:p="http://schemas.microsoft.com/office/2006/metadata/properties" xmlns:xsi="http://www.w3.org/2001/XMLSchema-instance" xmlns:pc="http://schemas.microsoft.com/office/infopath/2007/PartnerControls">
-  <documentManagement>
-    <_ip_UnifiedCompliancePolicyUIAction xmlns="http://schemas.microsoft.com/sharepoint/v3" xsi:nil="true"/>
-    <Image xmlns="71af3243-3dd4-4a8d-8c0d-dd76da1f02a5">
-      <Url xsi:nil="true"/>
-      <Description xsi:nil="true"/>
-    </Image>
-    <Status xmlns="71af3243-3dd4-4a8d-8c0d-dd76da1f02a5">Not started</Status>
-    <Background xmlns="71af3243-3dd4-4a8d-8c0d-dd76da1f02a5">false</Background>
-    <_ip_UnifiedCompliancePolicyProperties xmlns="http://schemas.microsoft.com/sharepoint/v3" xsi:nil="true"/>
-    <ImageTagsTaxHTField xmlns="71af3243-3dd4-4a8d-8c0d-dd76da1f02a5">
-      <Terms xmlns="http://schemas.microsoft.com/office/infopath/2007/PartnerControls"/>
-    </ImageTagsTaxHTField>
-    <TaxCatchAll xmlns="230e9df3-be65-4c73-a93b-d1236ebd677e" xsi:nil="true"/>
-    <MediaServiceKeyPoints xmlns="71af3243-3dd4-4a8d-8c0d-dd76da1f02a5" xsi:nil="true"/>
-  </documentManagement>
-</p:properties>
-</file>
-
 <file path=customXml/item3.xml><?xml version="1.0" encoding="utf-8"?>
 <?mso-contentType ?>
 <FormTemplates xmlns="http://schemas.microsoft.com/sharepoint/v3/contenttype/forms">
@@ -29897,6 +29897,18 @@
 </file>
 
 <file path=customXml/itemProps1.xml><?xml version="1.0" encoding="utf-8"?>
+<ds:datastoreItem xmlns:ds="http://schemas.openxmlformats.org/officeDocument/2006/customXml" ds:itemID="{85DF9CEC-52C2-4D14-B2F5-11176002A8B6}">
+  <ds:schemaRefs>
+    <ds:schemaRef ds:uri="http://schemas.microsoft.com/office/2006/metadata/properties"/>
+    <ds:schemaRef ds:uri="http://schemas.microsoft.com/office/infopath/2007/PartnerControls"/>
+    <ds:schemaRef ds:uri="http://schemas.microsoft.com/sharepoint/v3"/>
+    <ds:schemaRef ds:uri="71af3243-3dd4-4a8d-8c0d-dd76da1f02a5"/>
+    <ds:schemaRef ds:uri="230e9df3-be65-4c73-a93b-d1236ebd677e"/>
+  </ds:schemaRefs>
+</ds:datastoreItem>
+</file>
+
+<file path=customXml/itemProps2.xml><?xml version="1.0" encoding="utf-8"?>
 <ds:datastoreItem xmlns:ds="http://schemas.openxmlformats.org/officeDocument/2006/customXml" ds:itemID="{4D8B1D1D-0064-435C-8533-29A36067B8ED}">
   <ds:schemaRefs>
     <ds:schemaRef ds:uri="http://schemas.microsoft.com/office/2006/metadata/contentType"/>
@@ -29917,18 +29929,6 @@
 </ds:datastoreItem>
 </file>
 
-<file path=customXml/itemProps2.xml><?xml version="1.0" encoding="utf-8"?>
-<ds:datastoreItem xmlns:ds="http://schemas.openxmlformats.org/officeDocument/2006/customXml" ds:itemID="{85DF9CEC-52C2-4D14-B2F5-11176002A8B6}">
-  <ds:schemaRefs>
-    <ds:schemaRef ds:uri="http://schemas.microsoft.com/office/2006/metadata/properties"/>
-    <ds:schemaRef ds:uri="http://schemas.microsoft.com/office/infopath/2007/PartnerControls"/>
-    <ds:schemaRef ds:uri="http://schemas.microsoft.com/sharepoint/v3"/>
-    <ds:schemaRef ds:uri="71af3243-3dd4-4a8d-8c0d-dd76da1f02a5"/>
-    <ds:schemaRef ds:uri="230e9df3-be65-4c73-a93b-d1236ebd677e"/>
-  </ds:schemaRefs>
-</ds:datastoreItem>
-</file>
-
 <file path=customXml/itemProps3.xml><?xml version="1.0" encoding="utf-8"?>
 <ds:datastoreItem xmlns:ds="http://schemas.openxmlformats.org/officeDocument/2006/customXml" ds:itemID="{1249AD37-9510-4A2D-B790-12C439A83F93}">
   <ds:schemaRefs>

</xml_diff>